<commit_message>
fixed the neural network predictions and fixed powerpoint slides
</commit_message>
<xml_diff>
--- a/presentation.pptx
+++ b/presentation.pptx
@@ -225,7 +225,7 @@
           <a:p>
             <a:fld id="{59088EAF-6ECA-4616-85EF-35AA19C641F3}" type="datetimeFigureOut">
               <a:rPr lang="en-US"/>
-              <a:t>3/13/2023</a:t>
+              <a:t>3/14/2023</a:t>
             </a:fld>
             <a:endParaRPr/>
           </a:p>
@@ -390,7 +390,7 @@
           <a:p>
             <a:fld id="{3ABD2D7A-D230-4F91-BD59-0A39C2703BA8}" type="datetimeFigureOut">
               <a:rPr lang="en-US"/>
-              <a:t>3/13/2023</a:t>
+              <a:t>3/14/2023</a:t>
             </a:fld>
             <a:endParaRPr/>
           </a:p>
@@ -999,7 +999,7 @@
           <a:p>
             <a:fld id="{03F41C87-7AD9-4845-A077-840E4A0F3F06}" type="datetimeFigureOut">
               <a:rPr lang="en-US"/>
-              <a:t>3/13/2023</a:t>
+              <a:t>3/14/2023</a:t>
             </a:fld>
             <a:endParaRPr/>
           </a:p>
@@ -1191,7 +1191,7 @@
           <a:p>
             <a:fld id="{03F41C87-7AD9-4845-A077-840E4A0F3F06}" type="datetimeFigureOut">
               <a:rPr lang="en-US"/>
-              <a:t>3/13/2023</a:t>
+              <a:t>3/14/2023</a:t>
             </a:fld>
             <a:endParaRPr/>
           </a:p>
@@ -1380,7 +1380,7 @@
           <a:p>
             <a:fld id="{03F41C87-7AD9-4845-A077-840E4A0F3F06}" type="datetimeFigureOut">
               <a:rPr lang="en-US"/>
-              <a:t>3/13/2023</a:t>
+              <a:t>3/14/2023</a:t>
             </a:fld>
             <a:endParaRPr/>
           </a:p>
@@ -1660,7 +1660,7 @@
           <a:p>
             <a:fld id="{03F41C87-7AD9-4845-A077-840E4A0F3F06}" type="datetimeFigureOut">
               <a:rPr lang="en-US"/>
-              <a:t>3/13/2023</a:t>
+              <a:t>3/14/2023</a:t>
             </a:fld>
             <a:endParaRPr/>
           </a:p>
@@ -1964,7 +1964,7 @@
           <a:p>
             <a:fld id="{03F41C87-7AD9-4845-A077-840E4A0F3F06}" type="datetimeFigureOut">
               <a:rPr lang="en-US"/>
-              <a:t>3/13/2023</a:t>
+              <a:t>3/14/2023</a:t>
             </a:fld>
             <a:endParaRPr/>
           </a:p>
@@ -2420,7 +2420,7 @@
           <a:p>
             <a:fld id="{03F41C87-7AD9-4845-A077-840E4A0F3F06}" type="datetimeFigureOut">
               <a:rPr lang="en-US"/>
-              <a:t>3/13/2023</a:t>
+              <a:t>3/14/2023</a:t>
             </a:fld>
             <a:endParaRPr/>
           </a:p>
@@ -2550,7 +2550,7 @@
           <a:p>
             <a:fld id="{03F41C87-7AD9-4845-A077-840E4A0F3F06}" type="datetimeFigureOut">
               <a:rPr lang="en-US"/>
-              <a:t>3/13/2023</a:t>
+              <a:t>3/14/2023</a:t>
             </a:fld>
             <a:endParaRPr/>
           </a:p>
@@ -2665,7 +2665,7 @@
           <a:p>
             <a:fld id="{03F41C87-7AD9-4845-A077-840E4A0F3F06}" type="datetimeFigureOut">
               <a:rPr lang="en-US"/>
-              <a:t>3/13/2023</a:t>
+              <a:t>3/14/2023</a:t>
             </a:fld>
             <a:endParaRPr/>
           </a:p>
@@ -2987,7 +2987,7 @@
           <a:p>
             <a:fld id="{03F41C87-7AD9-4845-A077-840E4A0F3F06}" type="datetimeFigureOut">
               <a:rPr lang="en-US"/>
-              <a:t>3/13/2023</a:t>
+              <a:t>3/14/2023</a:t>
             </a:fld>
             <a:endParaRPr/>
           </a:p>
@@ -3299,7 +3299,7 @@
             <a:fld id="{03F41C87-7AD9-4845-A077-840E4A0F3F06}" type="datetimeFigureOut">
               <a:rPr lang="en-US"/>
               <a:pPr/>
-              <a:t>3/13/2023</a:t>
+              <a:t>3/14/2023</a:t>
             </a:fld>
             <a:endParaRPr/>
           </a:p>
@@ -3553,7 +3553,7 @@
             <a:fld id="{03F41C87-7AD9-4845-A077-840E4A0F3F06}" type="datetimeFigureOut">
               <a:rPr lang="en-US" smtClean="0"/>
               <a:pPr/>
-              <a:t>3/13/2023</a:t>
+              <a:t>3/14/2023</a:t>
             </a:fld>
             <a:endParaRPr lang="en-US"/>
           </a:p>
@@ -4238,13 +4238,13 @@
   <p:clrMapOvr>
     <a:masterClrMapping/>
   </p:clrMapOvr>
-  <mc:AlternateContent xmlns:mc="http://schemas.openxmlformats.org/markup-compatibility/2006">
-    <mc:Choice xmlns:p14="http://schemas.microsoft.com/office/powerpoint/2010/main" Requires="p14">
+  <mc:AlternateContent xmlns:mc="http://schemas.openxmlformats.org/markup-compatibility/2006" xmlns:p14="http://schemas.microsoft.com/office/powerpoint/2010/main">
+    <mc:Choice Requires="p14">
       <p:transition spd="med" p14:dur="700">
         <p:fade/>
       </p:transition>
     </mc:Choice>
-    <mc:Fallback>
+    <mc:Fallback xmlns="">
       <p:transition spd="med">
         <p:fade/>
       </p:transition>
@@ -4725,13 +4725,13 @@
   <p:clrMapOvr>
     <a:masterClrMapping/>
   </p:clrMapOvr>
-  <mc:AlternateContent xmlns:mc="http://schemas.openxmlformats.org/markup-compatibility/2006">
-    <mc:Choice xmlns:p14="http://schemas.microsoft.com/office/powerpoint/2010/main" Requires="p14">
+  <mc:AlternateContent xmlns:mc="http://schemas.openxmlformats.org/markup-compatibility/2006" xmlns:p14="http://schemas.microsoft.com/office/powerpoint/2010/main">
+    <mc:Choice Requires="p14">
       <p:transition spd="med" p14:dur="700">
         <p:fade/>
       </p:transition>
     </mc:Choice>
-    <mc:Fallback>
+    <mc:Fallback xmlns="">
       <p:transition spd="med">
         <p:fade/>
       </p:transition>
@@ -5024,13 +5024,13 @@
   <p:clrMapOvr>
     <a:masterClrMapping/>
   </p:clrMapOvr>
-  <mc:AlternateContent xmlns:mc="http://schemas.openxmlformats.org/markup-compatibility/2006">
-    <mc:Choice xmlns:p14="http://schemas.microsoft.com/office/powerpoint/2010/main" Requires="p14">
+  <mc:AlternateContent xmlns:mc="http://schemas.openxmlformats.org/markup-compatibility/2006" xmlns:p14="http://schemas.microsoft.com/office/powerpoint/2010/main">
+    <mc:Choice Requires="p14">
       <p:transition spd="med" p14:dur="700">
         <p:fade/>
       </p:transition>
     </mc:Choice>
-    <mc:Fallback>
+    <mc:Fallback xmlns="">
       <p:transition spd="med">
         <p:fade/>
       </p:transition>
@@ -5103,7 +5103,9 @@
         </p:nvSpPr>
         <p:spPr/>
         <p:txBody>
-          <a:bodyPr/>
+          <a:bodyPr>
+            <a:normAutofit lnSpcReduction="10000"/>
+          </a:bodyPr>
           <a:lstStyle/>
           <a:p>
             <a:r>
@@ -5127,13 +5129,31 @@
           <a:p>
             <a:r>
               <a:rPr lang="en-US" dirty="0"/>
-              <a:t>Training accuracy: 63%</a:t>
+              <a:t>Training accuracy: 74%</a:t>
             </a:r>
           </a:p>
           <a:p>
             <a:r>
               <a:rPr lang="en-US" dirty="0"/>
-              <a:t>Testing accuracy: 63%</a:t>
+              <a:t>Testing accuracy: 74%</a:t>
+            </a:r>
+          </a:p>
+          <a:p>
+            <a:r>
+              <a:rPr lang="en-US" dirty="0"/>
+              <a:t>Recall: 57%</a:t>
+            </a:r>
+          </a:p>
+          <a:p>
+            <a:r>
+              <a:rPr lang="en-US" dirty="0"/>
+              <a:t>Precision: 69%</a:t>
+            </a:r>
+          </a:p>
+          <a:p>
+            <a:r>
+              <a:rPr lang="en-US" dirty="0"/>
+              <a:t>F1 Score: 62%</a:t>
             </a:r>
           </a:p>
         </p:txBody>
@@ -5170,10 +5190,10 @@
       </p:pic>
       <p:pic>
         <p:nvPicPr>
-          <p:cNvPr id="8" name="Picture 7">
+          <p:cNvPr id="5" name="Picture 4">
             <a:extLst>
               <a:ext uri="{FF2B5EF4-FFF2-40B4-BE49-F238E27FC236}">
-                <a16:creationId xmlns:a16="http://schemas.microsoft.com/office/drawing/2014/main" id="{96CC5AF1-54AB-8BB6-C5DC-55AD2F2D6564}"/>
+                <a16:creationId xmlns:a16="http://schemas.microsoft.com/office/drawing/2014/main" id="{2FFE3AF4-AD56-6C38-2CB4-F1A11C8B3236}"/>
               </a:ext>
             </a:extLst>
           </p:cNvPr>
@@ -5190,8 +5210,8 @@
         </p:blipFill>
         <p:spPr>
           <a:xfrm>
-            <a:off x="6670476" y="3515295"/>
-            <a:ext cx="4572000" cy="3009900"/>
+            <a:off x="6814492" y="3573016"/>
+            <a:ext cx="4419598" cy="2925994"/>
           </a:xfrm>
           <a:prstGeom prst="rect">
             <a:avLst/>

</xml_diff>